<commit_message>
Adjusted size of diagram in DG 2
</commit_message>
<xml_diff>
--- a/docs/diagrams/NoteExportSequenceDiagram.pptx
+++ b/docs/diagrams/NoteExportSequenceDiagram.pptx
@@ -109,7 +109,7 @@
   </p:defaultTextStyle>
   <p:extLst>
     <p:ext uri="{EFAFB233-063F-42B5-8137-9DF3F51BA10A}">
-      <p15:sldGuideLst xmlns:p15="http://schemas.microsoft.com/office/powerpoint/2012/main" xmlns="">
+      <p15:sldGuideLst xmlns="" xmlns:p15="http://schemas.microsoft.com/office/powerpoint/2012/main">
         <p15:guide id="1" orient="horz" pos="1488">
           <p15:clr>
             <a:srgbClr val="A4A3A4"/>
@@ -3454,8 +3454,8 @@
         </p:nvSpPr>
         <p:spPr>
           <a:xfrm>
-            <a:off x="10630424" y="220978"/>
-            <a:ext cx="5142976" cy="7322822"/>
+            <a:off x="9017544" y="236218"/>
+            <a:ext cx="5067642" cy="7322822"/>
           </a:xfrm>
           <a:prstGeom prst="roundRect">
             <a:avLst>
@@ -3515,7 +3515,7 @@
         </p:nvSpPr>
         <p:spPr>
           <a:xfrm>
-            <a:off x="10977841" y="4389016"/>
+            <a:off x="9345750" y="4389016"/>
             <a:ext cx="4566959" cy="1325984"/>
           </a:xfrm>
           <a:prstGeom prst="rect">
@@ -3567,7 +3567,7 @@
         <p:spPr>
           <a:xfrm>
             <a:off x="214066" y="190499"/>
-            <a:ext cx="10225334" cy="7353301"/>
+            <a:ext cx="8559869" cy="7353301"/>
           </a:xfrm>
           <a:prstGeom prst="roundRect">
             <a:avLst>
@@ -3780,7 +3780,7 @@
         </p:nvSpPr>
         <p:spPr>
           <a:xfrm>
-            <a:off x="4782370" y="423022"/>
+            <a:off x="3158654" y="423022"/>
             <a:ext cx="1219200" cy="467684"/>
           </a:xfrm>
           <a:prstGeom prst="rect">
@@ -3816,7 +3816,7 @@
           <a:p>
             <a:pPr algn="ctr"/>
             <a:r>
-              <a:rPr lang="en-US" sz="1600" dirty="0">
+              <a:rPr lang="en-US" sz="1400" dirty="0">
                 <a:solidFill>
                   <a:schemeClr val="bg1"/>
                 </a:solidFill>
@@ -3827,14 +3827,14 @@
           <a:p>
             <a:pPr algn="ctr"/>
             <a:r>
-              <a:rPr lang="en-US" sz="1600" dirty="0" err="1">
+              <a:rPr lang="en-US" sz="1400" dirty="0" err="1">
                 <a:solidFill>
                   <a:schemeClr val="bg1"/>
                 </a:solidFill>
               </a:rPr>
               <a:t>BookParser</a:t>
             </a:r>
-            <a:endParaRPr lang="en-SG" sz="1600" dirty="0">
+            <a:endParaRPr lang="en-SG" sz="1400" dirty="0">
               <a:solidFill>
                 <a:schemeClr val="bg1"/>
               </a:solidFill>
@@ -3852,7 +3852,7 @@
         </p:nvCxnSpPr>
         <p:spPr>
           <a:xfrm>
-            <a:off x="5395769" y="907617"/>
+            <a:off x="3772053" y="907617"/>
             <a:ext cx="0" cy="1981289"/>
           </a:xfrm>
           <a:prstGeom prst="line">
@@ -3889,7 +3889,7 @@
         </p:nvSpPr>
         <p:spPr>
           <a:xfrm>
-            <a:off x="5323762" y="1365810"/>
+            <a:off x="3700046" y="1365810"/>
             <a:ext cx="154408" cy="1296570"/>
           </a:xfrm>
           <a:prstGeom prst="rect">
@@ -3942,7 +3942,7 @@
         </p:nvCxnSpPr>
         <p:spPr>
           <a:xfrm>
-            <a:off x="7054591" y="2018468"/>
+            <a:off x="5430875" y="2018468"/>
             <a:ext cx="0" cy="870438"/>
           </a:xfrm>
           <a:prstGeom prst="line">
@@ -3979,7 +3979,7 @@
         </p:nvSpPr>
         <p:spPr>
           <a:xfrm>
-            <a:off x="6978391" y="1613633"/>
+            <a:off x="5354675" y="1613633"/>
             <a:ext cx="152400" cy="978160"/>
           </a:xfrm>
           <a:prstGeom prst="rect">
@@ -4026,8 +4026,8 @@
         </p:nvCxnSpPr>
         <p:spPr>
           <a:xfrm>
-            <a:off x="-914400" y="1261999"/>
-            <a:ext cx="2453351" cy="0"/>
+            <a:off x="-334204" y="1261999"/>
+            <a:ext cx="1873155" cy="0"/>
           </a:xfrm>
           <a:prstGeom prst="straightConnector1">
             <a:avLst/>
@@ -4062,8 +4062,8 @@
         </p:nvSpPr>
         <p:spPr>
           <a:xfrm>
-            <a:off x="-914400" y="1029206"/>
-            <a:ext cx="2362200" cy="184666"/>
+            <a:off x="-334204" y="867416"/>
+            <a:ext cx="1873155" cy="369332"/>
           </a:xfrm>
           <a:prstGeom prst="rect">
             <a:avLst/>
@@ -4076,7 +4076,6 @@
           </a:bodyPr>
           <a:lstStyle/>
           <a:p>
-            <a:pPr algn="ctr"/>
             <a:r>
               <a:rPr lang="en-US" sz="1200" dirty="0">
                 <a:solidFill>
@@ -4091,7 +4090,25 @@
                   <a:srgbClr val="0070C0"/>
                 </a:solidFill>
               </a:rPr>
-              <a:t>(“note export </a:t>
+              <a:t>(</a:t>
+            </a:r>
+          </a:p>
+          <a:p>
+            <a:r>
+              <a:rPr lang="en-US" sz="1200" dirty="0" smtClean="0">
+                <a:solidFill>
+                  <a:srgbClr val="0070C0"/>
+                </a:solidFill>
+              </a:rPr>
+              <a:t>“</a:t>
+            </a:r>
+            <a:r>
+              <a:rPr lang="en-US" sz="1200" dirty="0" smtClean="0">
+                <a:solidFill>
+                  <a:srgbClr val="0070C0"/>
+                </a:solidFill>
+              </a:rPr>
+              <a:t>note export </a:t>
             </a:r>
             <a:r>
               <a:rPr lang="en-US" sz="1200" dirty="0" err="1" smtClean="0">
@@ -4127,7 +4144,7 @@
         </p:nvCxnSpPr>
         <p:spPr>
           <a:xfrm>
-            <a:off x="5479932" y="1491037"/>
+            <a:off x="3856216" y="1491037"/>
             <a:ext cx="729751" cy="0"/>
           </a:xfrm>
           <a:prstGeom prst="straightConnector1">
@@ -4163,7 +4180,7 @@
         </p:nvSpPr>
         <p:spPr>
           <a:xfrm>
-            <a:off x="5227868" y="3025397"/>
+            <a:off x="4377854" y="3025397"/>
             <a:ext cx="796144" cy="215444"/>
           </a:xfrm>
           <a:prstGeom prst="rect">
@@ -4207,7 +4224,7 @@
         </p:nvCxnSpPr>
         <p:spPr>
           <a:xfrm>
-            <a:off x="7130791" y="2469487"/>
+            <a:off x="5507075" y="2469487"/>
             <a:ext cx="2416846" cy="0"/>
           </a:xfrm>
           <a:prstGeom prst="straightConnector1">
@@ -4248,8 +4265,8 @@
         </p:nvCxnSpPr>
         <p:spPr>
           <a:xfrm>
-            <a:off x="1691998" y="2648316"/>
-            <a:ext cx="3708968" cy="14064"/>
+            <a:off x="1685385" y="2654448"/>
+            <a:ext cx="2091865" cy="7932"/>
           </a:xfrm>
           <a:prstGeom prst="straightConnector1">
             <a:avLst/>
@@ -4286,8 +4303,8 @@
         </p:nvCxnSpPr>
         <p:spPr>
           <a:xfrm>
-            <a:off x="0" y="7116256"/>
-            <a:ext cx="1546570" cy="0"/>
+            <a:off x="-228600" y="7116256"/>
+            <a:ext cx="1775170" cy="0"/>
           </a:xfrm>
           <a:prstGeom prst="straightConnector1">
             <a:avLst/>
@@ -4324,8 +4341,8 @@
         </p:nvSpPr>
         <p:spPr>
           <a:xfrm>
-            <a:off x="1855257" y="1106150"/>
-            <a:ext cx="3372611" cy="169277"/>
+            <a:off x="1871608" y="1009975"/>
+            <a:ext cx="1802343" cy="338554"/>
           </a:xfrm>
           <a:prstGeom prst="rect">
             <a:avLst/>
@@ -4356,11 +4373,18 @@
             </a:r>
             <a:r>
               <a:rPr lang="en-US" sz="1100" dirty="0" smtClean="0"/>
-              <a:t>(“</a:t>
+              <a:t>(</a:t>
+            </a:r>
+          </a:p>
+          <a:p>
+            <a:pPr algn="l"/>
+            <a:r>
+              <a:rPr lang="en-US" sz="1100" dirty="0" smtClean="0"/>
+              <a:t>“note </a:t>
             </a:r>
             <a:r>
               <a:rPr lang="en-US" sz="1100" dirty="0"/>
-              <a:t>note export </a:t>
+              <a:t>export </a:t>
             </a:r>
             <a:r>
               <a:rPr lang="en-US" sz="1100" dirty="0" err="1"/>
@@ -4386,7 +4410,7 @@
         </p:nvSpPr>
         <p:spPr>
           <a:xfrm>
-            <a:off x="5305903" y="6720509"/>
+            <a:off x="4465318" y="6720509"/>
             <a:ext cx="621216" cy="215444"/>
           </a:xfrm>
           <a:prstGeom prst="rect">
@@ -4467,7 +4491,7 @@
         </p:nvSpPr>
         <p:spPr>
           <a:xfrm>
-            <a:off x="2667000" y="2404568"/>
+            <a:off x="1866613" y="2388982"/>
             <a:ext cx="1658170" cy="215444"/>
           </a:xfrm>
           <a:prstGeom prst="rect">
@@ -4508,7 +4532,7 @@
         </p:nvSpPr>
         <p:spPr>
           <a:xfrm>
-            <a:off x="10820059" y="567236"/>
+            <a:off x="9187968" y="567236"/>
             <a:ext cx="1964442" cy="300180"/>
           </a:xfrm>
           <a:prstGeom prst="rect">
@@ -4578,7 +4602,7 @@
         </p:nvCxnSpPr>
         <p:spPr>
           <a:xfrm>
-            <a:off x="11802280" y="867416"/>
+            <a:off x="10170189" y="867416"/>
             <a:ext cx="0" cy="5385604"/>
           </a:xfrm>
           <a:prstGeom prst="line">
@@ -4615,7 +4639,7 @@
         </p:nvSpPr>
         <p:spPr>
           <a:xfrm>
-            <a:off x="11709915" y="3359670"/>
+            <a:off x="10077824" y="3359670"/>
             <a:ext cx="168896" cy="245509"/>
           </a:xfrm>
           <a:prstGeom prst="rect">
@@ -4662,7 +4686,7 @@
         </p:nvSpPr>
         <p:spPr>
           <a:xfrm>
-            <a:off x="6209683" y="1260268"/>
+            <a:off x="4585967" y="1260268"/>
             <a:ext cx="1689817" cy="461538"/>
           </a:xfrm>
           <a:prstGeom prst="rect">
@@ -4698,7 +4722,7 @@
           <a:p>
             <a:pPr algn="ctr"/>
             <a:r>
-              <a:rPr lang="en-US" sz="1600" dirty="0" smtClean="0">
+              <a:rPr lang="en-US" sz="1400" dirty="0" smtClean="0">
                 <a:solidFill>
                   <a:schemeClr val="bg1"/>
                 </a:solidFill>
@@ -4706,7 +4730,7 @@
               <a:t>:</a:t>
             </a:r>
             <a:r>
-              <a:rPr lang="en-US" sz="1600" dirty="0" err="1" smtClean="0">
+              <a:rPr lang="en-US" sz="1400" dirty="0" err="1" smtClean="0">
                 <a:solidFill>
                   <a:schemeClr val="bg1"/>
                 </a:solidFill>
@@ -4714,7 +4738,7 @@
               <a:t>NoteExport</a:t>
             </a:r>
             <a:r>
-              <a:rPr lang="en-US" sz="1600" dirty="0">
+              <a:rPr lang="en-US" sz="1400" dirty="0">
                 <a:solidFill>
                   <a:schemeClr val="bg1"/>
                 </a:solidFill>
@@ -4722,21 +4746,21 @@
               <a:t/>
             </a:r>
             <a:br>
-              <a:rPr lang="en-US" sz="1600" dirty="0">
+              <a:rPr lang="en-US" sz="1400" dirty="0">
                 <a:solidFill>
                   <a:schemeClr val="bg1"/>
                 </a:solidFill>
               </a:rPr>
             </a:br>
             <a:r>
-              <a:rPr lang="en-US" sz="1600" dirty="0" err="1" smtClean="0">
+              <a:rPr lang="en-US" sz="1400" dirty="0" err="1" smtClean="0">
                 <a:solidFill>
                   <a:schemeClr val="bg1"/>
                 </a:solidFill>
               </a:rPr>
               <a:t>CommandParser</a:t>
             </a:r>
-            <a:endParaRPr lang="en-SG" sz="1600" dirty="0">
+            <a:endParaRPr lang="en-SG" sz="1400" dirty="0">
               <a:solidFill>
                 <a:schemeClr val="bg1"/>
               </a:solidFill>
@@ -4749,7 +4773,7 @@
           <p:cNvPr id="67" name="Straight Arrow Connector 66">
             <a:extLst>
               <a:ext uri="{FF2B5EF4-FFF2-40B4-BE49-F238E27FC236}">
-                <a16:creationId xmlns:a16="http://schemas.microsoft.com/office/drawing/2014/main" xmlns="" id="{D881596E-177C-4FDC-8E60-CAB90B3D5FAB}"/>
+                <a16:creationId xmlns="" xmlns:a16="http://schemas.microsoft.com/office/drawing/2014/main" id="{D881596E-177C-4FDC-8E60-CAB90B3D5FAB}"/>
               </a:ext>
             </a:extLst>
           </p:cNvPr>
@@ -4760,8 +4784,8 @@
         </p:nvCxnSpPr>
         <p:spPr>
           <a:xfrm>
-            <a:off x="1708245" y="1363918"/>
-            <a:ext cx="3615517" cy="1892"/>
+            <a:off x="1691351" y="1363918"/>
+            <a:ext cx="2008695" cy="0"/>
           </a:xfrm>
           <a:prstGeom prst="straightConnector1">
             <a:avLst/>
@@ -4793,7 +4817,7 @@
           <p:cNvPr id="69" name="Straight Arrow Connector 68">
             <a:extLst>
               <a:ext uri="{FF2B5EF4-FFF2-40B4-BE49-F238E27FC236}">
-                <a16:creationId xmlns:a16="http://schemas.microsoft.com/office/drawing/2014/main" xmlns="" id="{7C9F21BC-13A9-471F-825A-2621FD36355F}"/>
+                <a16:creationId xmlns="" xmlns:a16="http://schemas.microsoft.com/office/drawing/2014/main" id="{7C9F21BC-13A9-471F-825A-2621FD36355F}"/>
               </a:ext>
             </a:extLst>
           </p:cNvPr>
@@ -4805,7 +4829,7 @@
         <p:spPr>
           <a:xfrm>
             <a:off x="1708245" y="6988858"/>
-            <a:ext cx="7856262" cy="0"/>
+            <a:ext cx="6215676" cy="0"/>
           </a:xfrm>
           <a:prstGeom prst="straightConnector1">
             <a:avLst/>
@@ -4839,7 +4863,7 @@
           <p:cNvPr id="63" name="Straight Arrow Connector 62">
             <a:extLst>
               <a:ext uri="{FF2B5EF4-FFF2-40B4-BE49-F238E27FC236}">
-                <a16:creationId xmlns:a16="http://schemas.microsoft.com/office/drawing/2014/main" xmlns="" id="{7C9F21BC-13A9-471F-825A-2621FD36355F}"/>
+                <a16:creationId xmlns="" xmlns:a16="http://schemas.microsoft.com/office/drawing/2014/main" id="{7C9F21BC-13A9-471F-825A-2621FD36355F}"/>
               </a:ext>
             </a:extLst>
           </p:cNvPr>
@@ -4851,7 +4875,7 @@
         </p:nvCxnSpPr>
         <p:spPr>
           <a:xfrm>
-            <a:off x="9700037" y="3605179"/>
+            <a:off x="8067946" y="3605179"/>
             <a:ext cx="2094326" cy="0"/>
           </a:xfrm>
           <a:prstGeom prst="straightConnector1">
@@ -4889,7 +4913,7 @@
         </p:nvSpPr>
         <p:spPr>
           <a:xfrm>
-            <a:off x="8985662" y="1818083"/>
+            <a:off x="7361946" y="1818083"/>
             <a:ext cx="1276350" cy="461538"/>
           </a:xfrm>
           <a:prstGeom prst="rect">
@@ -4979,7 +5003,7 @@
         </p:nvSpPr>
         <p:spPr>
           <a:xfrm>
-            <a:off x="9547637" y="2265052"/>
+            <a:off x="7923921" y="2265052"/>
             <a:ext cx="152400" cy="224734"/>
           </a:xfrm>
           <a:prstGeom prst="rect">
@@ -5028,7 +5052,7 @@
         </p:nvCxnSpPr>
         <p:spPr>
           <a:xfrm>
-            <a:off x="7130791" y="2048852"/>
+            <a:off x="5507075" y="2048852"/>
             <a:ext cx="1854871" cy="0"/>
           </a:xfrm>
           <a:prstGeom prst="straightConnector1">
@@ -5064,7 +5088,7 @@
         </p:nvSpPr>
         <p:spPr>
           <a:xfrm>
-            <a:off x="5557626" y="1256196"/>
+            <a:off x="3933910" y="1256196"/>
             <a:ext cx="574361" cy="184666"/>
           </a:xfrm>
           <a:prstGeom prst="rect">
@@ -5106,7 +5130,7 @@
         </p:nvCxnSpPr>
         <p:spPr>
           <a:xfrm>
-            <a:off x="5479932" y="2587501"/>
+            <a:off x="3856216" y="2587501"/>
             <a:ext cx="1510000" cy="0"/>
           </a:xfrm>
           <a:prstGeom prst="straightConnector1">
@@ -5144,7 +5168,7 @@
         </p:nvSpPr>
         <p:spPr>
           <a:xfrm>
-            <a:off x="7215634" y="1828139"/>
+            <a:off x="5591918" y="1828139"/>
             <a:ext cx="1696868" cy="184666"/>
           </a:xfrm>
           <a:prstGeom prst="rect">
@@ -5193,7 +5217,7 @@
         </p:nvCxnSpPr>
         <p:spPr>
           <a:xfrm>
-            <a:off x="9623837" y="2265052"/>
+            <a:off x="8000121" y="2265052"/>
             <a:ext cx="0" cy="4973948"/>
           </a:xfrm>
           <a:prstGeom prst="line">
@@ -5227,7 +5251,7 @@
           <p:cNvPr id="98" name="Straight Arrow Connector 97">
             <a:extLst>
               <a:ext uri="{FF2B5EF4-FFF2-40B4-BE49-F238E27FC236}">
-                <a16:creationId xmlns:a16="http://schemas.microsoft.com/office/drawing/2014/main" xmlns="" id="{D881596E-177C-4FDC-8E60-CAB90B3D5FAB}"/>
+                <a16:creationId xmlns="" xmlns:a16="http://schemas.microsoft.com/office/drawing/2014/main" id="{D881596E-177C-4FDC-8E60-CAB90B3D5FAB}"/>
               </a:ext>
             </a:extLst>
           </p:cNvPr>
@@ -5239,7 +5263,7 @@
         <p:spPr>
           <a:xfrm>
             <a:off x="1685385" y="3262962"/>
-            <a:ext cx="7862252" cy="0"/>
+            <a:ext cx="6238536" cy="0"/>
           </a:xfrm>
           <a:prstGeom prst="straightConnector1">
             <a:avLst/>
@@ -5274,7 +5298,7 @@
         </p:nvSpPr>
         <p:spPr>
           <a:xfrm>
-            <a:off x="9547637" y="3240841"/>
+            <a:off x="7923921" y="3240841"/>
             <a:ext cx="152400" cy="3845760"/>
           </a:xfrm>
           <a:prstGeom prst="rect">
@@ -5321,7 +5345,7 @@
         </p:nvCxnSpPr>
         <p:spPr>
           <a:xfrm>
-            <a:off x="9700037" y="3382121"/>
+            <a:off x="8067946" y="3382121"/>
             <a:ext cx="2009878" cy="0"/>
           </a:xfrm>
           <a:prstGeom prst="straightConnector1">
@@ -5357,7 +5381,7 @@
         </p:nvSpPr>
         <p:spPr>
           <a:xfrm>
-            <a:off x="10172138" y="3137303"/>
+            <a:off x="8540047" y="3137303"/>
             <a:ext cx="1065676" cy="215444"/>
           </a:xfrm>
           <a:prstGeom prst="rect">
@@ -5396,26 +5420,23 @@
       </p:sp>
       <p:cxnSp>
         <p:nvCxnSpPr>
-          <p:cNvPr id="126" name="Curved Connector 125"/>
+          <p:cNvPr id="127" name="Straight Arrow Connector 126"/>
           <p:cNvCxnSpPr/>
           <p:nvPr/>
         </p:nvCxnSpPr>
         <p:spPr>
-          <a:xfrm rot="16200000" flipH="1">
-            <a:off x="11775338" y="3393110"/>
-            <a:ext cx="156923" cy="76200"/>
-          </a:xfrm>
-          <a:prstGeom prst="curvedConnector4">
-            <a:avLst>
-              <a:gd name="adj1" fmla="val -145677"/>
-              <a:gd name="adj2" fmla="val 400000"/>
-            </a:avLst>
-          </a:prstGeom>
-          <a:ln>
+          <a:xfrm>
+            <a:off x="8067946" y="4063054"/>
+            <a:ext cx="2042160" cy="729"/>
+          </a:xfrm>
+          <a:prstGeom prst="straightConnector1">
+            <a:avLst/>
+          </a:prstGeom>
+          <a:ln w="19050">
             <a:solidFill>
-              <a:srgbClr val="7030A0"/>
+              <a:srgbClr val="0070C0"/>
             </a:solidFill>
-            <a:tailEnd type="triangle"/>
+            <a:tailEnd type="arrow"/>
           </a:ln>
         </p:spPr>
         <p:style>
@@ -5433,42 +5454,6 @@
           </a:fontRef>
         </p:style>
       </p:cxnSp>
-      <p:cxnSp>
-        <p:nvCxnSpPr>
-          <p:cNvPr id="127" name="Straight Arrow Connector 126"/>
-          <p:cNvCxnSpPr/>
-          <p:nvPr/>
-        </p:nvCxnSpPr>
-        <p:spPr>
-          <a:xfrm>
-            <a:off x="9700037" y="4063054"/>
-            <a:ext cx="2042160" cy="729"/>
-          </a:xfrm>
-          <a:prstGeom prst="straightConnector1">
-            <a:avLst/>
-          </a:prstGeom>
-          <a:ln w="19050">
-            <a:solidFill>
-              <a:srgbClr val="0070C0"/>
-            </a:solidFill>
-            <a:tailEnd type="arrow"/>
-          </a:ln>
-        </p:spPr>
-        <p:style>
-          <a:lnRef idx="1">
-            <a:schemeClr val="accent1"/>
-          </a:lnRef>
-          <a:fillRef idx="0">
-            <a:schemeClr val="accent1"/>
-          </a:fillRef>
-          <a:effectRef idx="0">
-            <a:schemeClr val="accent1"/>
-          </a:effectRef>
-          <a:fontRef idx="minor">
-            <a:schemeClr val="tx1"/>
-          </a:fontRef>
-        </p:style>
-      </p:cxnSp>
       <p:sp>
         <p:nvSpPr>
           <p:cNvPr id="128" name="Rectangle 127"/>
@@ -5477,7 +5462,7 @@
         </p:nvSpPr>
         <p:spPr>
           <a:xfrm>
-            <a:off x="11713873" y="4036462"/>
+            <a:off x="10081782" y="4036462"/>
             <a:ext cx="168896" cy="2059538"/>
           </a:xfrm>
           <a:prstGeom prst="rect">
@@ -5524,7 +5509,7 @@
         </p:nvSpPr>
         <p:spPr>
           <a:xfrm>
-            <a:off x="9895359" y="3821018"/>
+            <a:off x="8263268" y="3821018"/>
             <a:ext cx="1651516" cy="215444"/>
           </a:xfrm>
           <a:prstGeom prst="rect">
@@ -5569,7 +5554,7 @@
         </p:nvSpPr>
         <p:spPr>
           <a:xfrm>
-            <a:off x="13716000" y="4918451"/>
+            <a:off x="12083909" y="4918451"/>
             <a:ext cx="1676400" cy="300180"/>
           </a:xfrm>
           <a:prstGeom prst="rect">
@@ -5636,7 +5621,7 @@
         </p:nvSpPr>
         <p:spPr>
           <a:xfrm rot="10800000" flipH="1">
-            <a:off x="10977841" y="4404308"/>
+            <a:off x="9345750" y="4404308"/>
             <a:ext cx="569034" cy="335384"/>
           </a:xfrm>
           <a:prstGeom prst="snip1Rect">
@@ -5689,7 +5674,7 @@
         </p:nvSpPr>
         <p:spPr>
           <a:xfrm>
-            <a:off x="11053897" y="4478774"/>
+            <a:off x="9421806" y="4478774"/>
             <a:ext cx="406761" cy="184666"/>
           </a:xfrm>
           <a:prstGeom prst="rect">
@@ -5739,7 +5724,7 @@
         </p:nvSpPr>
         <p:spPr>
           <a:xfrm>
-            <a:off x="11942155" y="4439842"/>
+            <a:off x="10310064" y="4439842"/>
             <a:ext cx="1110340" cy="307777"/>
           </a:xfrm>
           <a:prstGeom prst="rect">
@@ -5790,7 +5775,7 @@
         </p:nvCxnSpPr>
         <p:spPr>
           <a:xfrm>
-            <a:off x="11891900" y="5068541"/>
+            <a:off x="10259809" y="5068541"/>
             <a:ext cx="1824100" cy="0"/>
           </a:xfrm>
           <a:prstGeom prst="straightConnector1">
@@ -5829,7 +5814,7 @@
         </p:nvCxnSpPr>
         <p:spPr>
           <a:xfrm>
-            <a:off x="14554200" y="5218631"/>
+            <a:off x="12922109" y="5218631"/>
             <a:ext cx="0" cy="724969"/>
           </a:xfrm>
           <a:prstGeom prst="line">
@@ -5863,7 +5848,7 @@
           <p:cNvPr id="154" name="Straight Arrow Connector 153">
             <a:extLst>
               <a:ext uri="{FF2B5EF4-FFF2-40B4-BE49-F238E27FC236}">
-                <a16:creationId xmlns:a16="http://schemas.microsoft.com/office/drawing/2014/main" xmlns="" id="{7C9F21BC-13A9-471F-825A-2621FD36355F}"/>
+                <a16:creationId xmlns="" xmlns:a16="http://schemas.microsoft.com/office/drawing/2014/main" id="{7C9F21BC-13A9-471F-825A-2621FD36355F}"/>
               </a:ext>
             </a:extLst>
           </p:cNvPr>
@@ -5874,7 +5859,7 @@
         </p:nvCxnSpPr>
         <p:spPr>
           <a:xfrm>
-            <a:off x="11891900" y="5464140"/>
+            <a:off x="10259809" y="5464140"/>
             <a:ext cx="2623026" cy="0"/>
           </a:xfrm>
           <a:prstGeom prst="straightConnector1">
@@ -5912,7 +5897,7 @@
         </p:nvSpPr>
         <p:spPr>
           <a:xfrm>
-            <a:off x="14469752" y="5218631"/>
+            <a:off x="12837661" y="5218631"/>
             <a:ext cx="168896" cy="245509"/>
           </a:xfrm>
           <a:prstGeom prst="rect">
@@ -5959,7 +5944,7 @@
         </p:nvSpPr>
         <p:spPr>
           <a:xfrm>
-            <a:off x="11963399" y="4890234"/>
+            <a:off x="10331308" y="4890234"/>
             <a:ext cx="1608589" cy="138499"/>
           </a:xfrm>
           <a:prstGeom prst="rect">
@@ -6029,7 +6014,7 @@
           <p:cNvPr id="168" name="Straight Arrow Connector 167">
             <a:extLst>
               <a:ext uri="{FF2B5EF4-FFF2-40B4-BE49-F238E27FC236}">
-                <a16:creationId xmlns:a16="http://schemas.microsoft.com/office/drawing/2014/main" xmlns="" id="{7C9F21BC-13A9-471F-825A-2621FD36355F}"/>
+                <a16:creationId xmlns="" xmlns:a16="http://schemas.microsoft.com/office/drawing/2014/main" id="{7C9F21BC-13A9-471F-825A-2621FD36355F}"/>
               </a:ext>
             </a:extLst>
           </p:cNvPr>
@@ -6040,7 +6025,7 @@
         </p:nvCxnSpPr>
         <p:spPr>
           <a:xfrm>
-            <a:off x="9700037" y="6092347"/>
+            <a:off x="8067946" y="6092347"/>
             <a:ext cx="2018126" cy="0"/>
           </a:xfrm>
           <a:prstGeom prst="straightConnector1">
@@ -6078,7 +6063,7 @@
         </p:nvSpPr>
         <p:spPr>
           <a:xfrm>
-            <a:off x="9916822" y="5874350"/>
+            <a:off x="8284731" y="5874350"/>
             <a:ext cx="1608589" cy="215444"/>
           </a:xfrm>
           <a:prstGeom prst="rect">
@@ -6128,7 +6113,7 @@
         </p:nvSpPr>
         <p:spPr>
           <a:xfrm>
-            <a:off x="15868912" y="5684995"/>
+            <a:off x="14220332" y="5684995"/>
             <a:ext cx="1790176" cy="1858805"/>
           </a:xfrm>
           <a:prstGeom prst="roundRect">
@@ -6189,7 +6174,7 @@
         </p:nvSpPr>
         <p:spPr>
           <a:xfrm>
-            <a:off x="15925800" y="6253020"/>
+            <a:off x="14277220" y="6253020"/>
             <a:ext cx="1676400" cy="300180"/>
           </a:xfrm>
           <a:prstGeom prst="rect">
@@ -6260,7 +6245,7 @@
         </p:nvCxnSpPr>
         <p:spPr>
           <a:xfrm>
-            <a:off x="9700037" y="6403110"/>
+            <a:off x="8051457" y="6403110"/>
             <a:ext cx="6225763" cy="0"/>
           </a:xfrm>
           <a:prstGeom prst="straightConnector1">
@@ -6299,7 +6284,7 @@
         </p:nvCxnSpPr>
         <p:spPr>
           <a:xfrm>
-            <a:off x="16764000" y="6553200"/>
+            <a:off x="15115420" y="6553200"/>
             <a:ext cx="6501" cy="786235"/>
           </a:xfrm>
           <a:prstGeom prst="line">
@@ -6338,7 +6323,7 @@
         </p:nvSpPr>
         <p:spPr>
           <a:xfrm>
-            <a:off x="16679552" y="6553200"/>
+            <a:off x="15030972" y="6553200"/>
             <a:ext cx="168896" cy="353493"/>
           </a:xfrm>
           <a:prstGeom prst="rect">
@@ -6387,7 +6372,7 @@
         </p:nvSpPr>
         <p:spPr>
           <a:xfrm>
-            <a:off x="12002424" y="6145298"/>
+            <a:off x="10643619" y="6145298"/>
             <a:ext cx="1651516" cy="215444"/>
           </a:xfrm>
           <a:prstGeom prst="rect">
@@ -6412,13 +6397,14 @@
             </a:lvl1pPr>
           </a:lstStyle>
           <a:p>
+            <a:pPr algn="ctr"/>
             <a:r>
               <a:rPr lang="en-SG" dirty="0" err="1" smtClean="0"/>
               <a:t>writeToCsv</a:t>
             </a:r>
             <a:r>
               <a:rPr lang="en-SG" dirty="0" smtClean="0"/>
-              <a:t>()</a:t>
+              <a:t>(…)</a:t>
             </a:r>
             <a:endParaRPr lang="en-US" dirty="0"/>
           </a:p>
@@ -6429,7 +6415,7 @@
           <p:cNvPr id="183" name="Straight Arrow Connector 182">
             <a:extLst>
               <a:ext uri="{FF2B5EF4-FFF2-40B4-BE49-F238E27FC236}">
-                <a16:creationId xmlns:a16="http://schemas.microsoft.com/office/drawing/2014/main" xmlns="" id="{7C9F21BC-13A9-471F-825A-2621FD36355F}"/>
+                <a16:creationId xmlns="" xmlns:a16="http://schemas.microsoft.com/office/drawing/2014/main" id="{7C9F21BC-13A9-471F-825A-2621FD36355F}"/>
               </a:ext>
             </a:extLst>
           </p:cNvPr>
@@ -6440,8 +6426,8 @@
         </p:nvCxnSpPr>
         <p:spPr>
           <a:xfrm>
-            <a:off x="9700037" y="6898202"/>
-            <a:ext cx="6979515" cy="0"/>
+            <a:off x="8076321" y="6898202"/>
+            <a:ext cx="6954651" cy="0"/>
           </a:xfrm>
           <a:prstGeom prst="straightConnector1">
             <a:avLst/>
@@ -6480,7 +6466,7 @@
         </p:nvCxnSpPr>
         <p:spPr>
           <a:xfrm rot="16200000" flipH="1">
-            <a:off x="16733800" y="6682409"/>
+            <a:off x="15083307" y="6682410"/>
             <a:ext cx="156923" cy="76200"/>
           </a:xfrm>
           <a:prstGeom prst="curvedConnector4">
@@ -6521,7 +6507,7 @@
         </p:nvSpPr>
         <p:spPr>
           <a:xfrm>
-            <a:off x="17063720" y="6579262"/>
+            <a:off x="15415140" y="6579262"/>
             <a:ext cx="429795" cy="246221"/>
           </a:xfrm>
           <a:prstGeom prst="rect">
@@ -6555,17 +6541,7 @@
                   </a:schemeClr>
                 </a:solidFill>
               </a:rPr>
-              <a:t>W</a:t>
-            </a:r>
-            <a:r>
-              <a:rPr lang="en-SG" sz="800" dirty="0" smtClean="0">
-                <a:solidFill>
-                  <a:schemeClr val="accent5">
-                    <a:lumMod val="50000"/>
-                  </a:schemeClr>
-                </a:solidFill>
-              </a:rPr>
-              <a:t>rite to file</a:t>
+              <a:t>Write to file</a:t>
             </a:r>
             <a:endParaRPr lang="en-US" sz="800" dirty="0">
               <a:solidFill>
@@ -6585,7 +6561,7 @@
         </p:nvSpPr>
         <p:spPr>
           <a:xfrm>
-            <a:off x="12002424" y="6671350"/>
+            <a:off x="10250678" y="6671350"/>
             <a:ext cx="2437398" cy="215444"/>
           </a:xfrm>
           <a:prstGeom prst="rect">

</xml_diff>